<commit_message>
addded updated Figure 10.7.1-1 (pptx and png files)
</commit_message>
<xml_diff>
--- a/ITI/TF/Volume1/media/Figure_10.7.1-1.pptx
+++ b/ITI/TF/Volume1/media/Figure_10.7.1-1.pptx
@@ -5,7 +5,7 @@
     <p:sldMasterId id="2147483648" r:id="rId1"/>
   </p:sldMasterIdLst>
   <p:sldIdLst>
-    <p:sldId id="256" r:id="rId2"/>
+    <p:sldId id="257" r:id="rId2"/>
   </p:sldIdLst>
   <p:sldSz cx="12192000" cy="6858000"/>
   <p:notesSz cx="6858000" cy="9144000"/>
@@ -259,7 +259,7 @@
           <a:p>
             <a:fld id="{75CE93A7-516F-3948-A658-F899CDEF2D18}" type="datetimeFigureOut">
               <a:rPr lang="en-US" smtClean="0"/>
-              <a:t>8/26/2020</a:t>
+              <a:t>4/22/2024</a:t>
             </a:fld>
             <a:endParaRPr lang="en-US"/>
           </a:p>
@@ -457,7 +457,7 @@
           <a:p>
             <a:fld id="{75CE93A7-516F-3948-A658-F899CDEF2D18}" type="datetimeFigureOut">
               <a:rPr lang="en-US" smtClean="0"/>
-              <a:t>8/26/2020</a:t>
+              <a:t>4/22/2024</a:t>
             </a:fld>
             <a:endParaRPr lang="en-US"/>
           </a:p>
@@ -665,7 +665,7 @@
           <a:p>
             <a:fld id="{75CE93A7-516F-3948-A658-F899CDEF2D18}" type="datetimeFigureOut">
               <a:rPr lang="en-US" smtClean="0"/>
-              <a:t>8/26/2020</a:t>
+              <a:t>4/22/2024</a:t>
             </a:fld>
             <a:endParaRPr lang="en-US"/>
           </a:p>
@@ -863,7 +863,7 @@
           <a:p>
             <a:fld id="{75CE93A7-516F-3948-A658-F899CDEF2D18}" type="datetimeFigureOut">
               <a:rPr lang="en-US" smtClean="0"/>
-              <a:t>8/26/2020</a:t>
+              <a:t>4/22/2024</a:t>
             </a:fld>
             <a:endParaRPr lang="en-US"/>
           </a:p>
@@ -1138,7 +1138,7 @@
           <a:p>
             <a:fld id="{75CE93A7-516F-3948-A658-F899CDEF2D18}" type="datetimeFigureOut">
               <a:rPr lang="en-US" smtClean="0"/>
-              <a:t>8/26/2020</a:t>
+              <a:t>4/22/2024</a:t>
             </a:fld>
             <a:endParaRPr lang="en-US"/>
           </a:p>
@@ -1403,7 +1403,7 @@
           <a:p>
             <a:fld id="{75CE93A7-516F-3948-A658-F899CDEF2D18}" type="datetimeFigureOut">
               <a:rPr lang="en-US" smtClean="0"/>
-              <a:t>8/26/2020</a:t>
+              <a:t>4/22/2024</a:t>
             </a:fld>
             <a:endParaRPr lang="en-US"/>
           </a:p>
@@ -1815,7 +1815,7 @@
           <a:p>
             <a:fld id="{75CE93A7-516F-3948-A658-F899CDEF2D18}" type="datetimeFigureOut">
               <a:rPr lang="en-US" smtClean="0"/>
-              <a:t>8/26/2020</a:t>
+              <a:t>4/22/2024</a:t>
             </a:fld>
             <a:endParaRPr lang="en-US"/>
           </a:p>
@@ -1956,7 +1956,7 @@
           <a:p>
             <a:fld id="{75CE93A7-516F-3948-A658-F899CDEF2D18}" type="datetimeFigureOut">
               <a:rPr lang="en-US" smtClean="0"/>
-              <a:t>8/26/2020</a:t>
+              <a:t>4/22/2024</a:t>
             </a:fld>
             <a:endParaRPr lang="en-US"/>
           </a:p>
@@ -2069,7 +2069,7 @@
           <a:p>
             <a:fld id="{75CE93A7-516F-3948-A658-F899CDEF2D18}" type="datetimeFigureOut">
               <a:rPr lang="en-US" smtClean="0"/>
-              <a:t>8/26/2020</a:t>
+              <a:t>4/22/2024</a:t>
             </a:fld>
             <a:endParaRPr lang="en-US"/>
           </a:p>
@@ -2380,7 +2380,7 @@
           <a:p>
             <a:fld id="{75CE93A7-516F-3948-A658-F899CDEF2D18}" type="datetimeFigureOut">
               <a:rPr lang="en-US" smtClean="0"/>
-              <a:t>8/26/2020</a:t>
+              <a:t>4/22/2024</a:t>
             </a:fld>
             <a:endParaRPr lang="en-US"/>
           </a:p>
@@ -2668,7 +2668,7 @@
           <a:p>
             <a:fld id="{75CE93A7-516F-3948-A658-F899CDEF2D18}" type="datetimeFigureOut">
               <a:rPr lang="en-US" smtClean="0"/>
-              <a:t>8/26/2020</a:t>
+              <a:t>4/22/2024</a:t>
             </a:fld>
             <a:endParaRPr lang="en-US"/>
           </a:p>
@@ -2909,7 +2909,7 @@
           <a:p>
             <a:fld id="{75CE93A7-516F-3948-A658-F899CDEF2D18}" type="datetimeFigureOut">
               <a:rPr lang="en-US" smtClean="0"/>
-              <a:t>8/26/2020</a:t>
+              <a:t>4/22/2024</a:t>
             </a:fld>
             <a:endParaRPr lang="en-US"/>
           </a:p>
@@ -3342,10 +3342,10 @@
         </p:nvGrpSpPr>
         <p:grpSpPr>
           <a:xfrm>
-            <a:off x="653142" y="542925"/>
-            <a:ext cx="10387465" cy="5886904"/>
-            <a:chOff x="0" y="457200"/>
-            <a:chExt cx="6353008" cy="3600450"/>
+            <a:off x="653142" y="506819"/>
+            <a:ext cx="10474734" cy="5743290"/>
+            <a:chOff x="0" y="423820"/>
+            <a:chExt cx="6406382" cy="3512616"/>
           </a:xfrm>
         </p:grpSpPr>
         <p:sp>
@@ -3364,14 +3364,17 @@
           </p:nvSpPr>
           <p:spPr bwMode="auto">
             <a:xfrm>
-              <a:off x="1800225" y="457200"/>
-              <a:ext cx="2576354" cy="1200150"/>
+              <a:off x="1750297" y="423820"/>
+              <a:ext cx="2576354" cy="1347830"/>
             </a:xfrm>
             <a:prstGeom prst="ellipse">
               <a:avLst/>
             </a:prstGeom>
             <a:solidFill>
-              <a:srgbClr val="FFFFFF"/>
+              <a:schemeClr val="accent4">
+                <a:lumMod val="40000"/>
+                <a:lumOff val="60000"/>
+              </a:schemeClr>
             </a:solidFill>
             <a:ln w="9525">
               <a:solidFill>
@@ -3391,7 +3394,7 @@
             </a:bodyPr>
             <a:lstStyle/>
             <a:p>
-              <a:pPr marL="0" marR="0" lvl="0" indent="0" algn="l" defTabSz="914400" rtl="0" eaLnBrk="0" fontAlgn="base" latinLnBrk="0" hangingPunct="0">
+              <a:pPr marL="0" marR="0" lvl="0" indent="0" algn="ctr" defTabSz="914400" rtl="0" eaLnBrk="0" fontAlgn="base" latinLnBrk="0" hangingPunct="0">
                 <a:lnSpc>
                   <a:spcPct val="100000"/>
                 </a:lnSpc>
@@ -3408,7 +3411,7 @@
                 <a:tabLst/>
               </a:pPr>
               <a:r>
-                <a:rPr kumimoji="0" lang="en-US" altLang="en-US" b="0" i="0" u="none" strike="noStrike" cap="none" normalizeH="0" baseline="0">
+                <a:rPr kumimoji="0" lang="en-US" altLang="en-US" b="1" i="0" u="none" strike="noStrike" cap="none" normalizeH="0" baseline="0" dirty="0">
                   <a:ln>
                     <a:noFill/>
                   </a:ln>
@@ -3421,7 +3424,7 @@
                 </a:rPr>
                 <a:t>Security Domain B</a:t>
               </a:r>
-              <a:endParaRPr kumimoji="0" lang="en-US" altLang="en-US" sz="2800" b="0" i="0" u="none" strike="noStrike" cap="none" normalizeH="0" baseline="0">
+              <a:endParaRPr kumimoji="0" lang="en-US" altLang="en-US" sz="2800" b="1" i="0" u="none" strike="noStrike" cap="none" normalizeH="0" baseline="0" dirty="0">
                 <a:ln>
                   <a:noFill/>
                 </a:ln>
@@ -3450,14 +3453,17 @@
           </p:nvSpPr>
           <p:spPr bwMode="auto">
             <a:xfrm>
-              <a:off x="0" y="2057400"/>
-              <a:ext cx="2264069" cy="1438275"/>
+              <a:off x="0" y="2068746"/>
+              <a:ext cx="2509766" cy="1418379"/>
             </a:xfrm>
             <a:prstGeom prst="ellipse">
               <a:avLst/>
             </a:prstGeom>
             <a:solidFill>
-              <a:srgbClr val="FFFFFF"/>
+              <a:schemeClr val="accent4">
+                <a:lumMod val="40000"/>
+                <a:lumOff val="60000"/>
+              </a:schemeClr>
             </a:solidFill>
             <a:ln w="9525">
               <a:solidFill>
@@ -3477,7 +3483,7 @@
             </a:bodyPr>
             <a:lstStyle/>
             <a:p>
-              <a:pPr marL="0" marR="0" lvl="0" indent="0" algn="l" defTabSz="914400" rtl="0" eaLnBrk="0" fontAlgn="base" latinLnBrk="0" hangingPunct="0">
+              <a:pPr marL="0" marR="0" lvl="0" indent="0" algn="ctr" defTabSz="914400" rtl="0" eaLnBrk="0" fontAlgn="base" latinLnBrk="0" hangingPunct="0">
                 <a:lnSpc>
                   <a:spcPct val="100000"/>
                 </a:lnSpc>
@@ -3494,7 +3500,7 @@
                 <a:tabLst/>
               </a:pPr>
               <a:r>
-                <a:rPr kumimoji="0" lang="en-US" altLang="en-US" b="0" i="0" u="none" strike="noStrike" cap="none" normalizeH="0" baseline="0">
+                <a:rPr kumimoji="0" lang="en-US" altLang="en-US" b="1" i="0" u="none" strike="noStrike" cap="none" normalizeH="0" baseline="0" dirty="0">
                   <a:ln>
                     <a:noFill/>
                   </a:ln>
@@ -3507,7 +3513,7 @@
                 </a:rPr>
                 <a:t>Security Domain A</a:t>
               </a:r>
-              <a:endParaRPr kumimoji="0" lang="en-US" altLang="en-US" sz="2800" b="0" i="0" u="none" strike="noStrike" cap="none" normalizeH="0" baseline="0">
+              <a:endParaRPr kumimoji="0" lang="en-US" altLang="en-US" sz="2800" b="1" i="0" u="none" strike="noStrike" cap="none" normalizeH="0" baseline="0" dirty="0">
                 <a:ln>
                   <a:noFill/>
                 </a:ln>
@@ -3536,14 +3542,17 @@
           </p:nvSpPr>
           <p:spPr bwMode="auto">
             <a:xfrm>
-              <a:off x="4076699" y="1866900"/>
-              <a:ext cx="2208303" cy="1543050"/>
+              <a:off x="4198079" y="2171564"/>
+              <a:ext cx="2208303" cy="1347831"/>
             </a:xfrm>
             <a:prstGeom prst="ellipse">
               <a:avLst/>
             </a:prstGeom>
             <a:solidFill>
-              <a:srgbClr val="FFFFFF"/>
+              <a:schemeClr val="accent4">
+                <a:lumMod val="40000"/>
+                <a:lumOff val="60000"/>
+              </a:schemeClr>
             </a:solidFill>
             <a:ln w="9525">
               <a:solidFill>
@@ -3563,7 +3572,7 @@
             </a:bodyPr>
             <a:lstStyle/>
             <a:p>
-              <a:pPr marL="0" marR="0" lvl="0" indent="0" algn="l" defTabSz="914400" rtl="0" eaLnBrk="0" fontAlgn="base" latinLnBrk="0" hangingPunct="0">
+              <a:pPr marL="0" marR="0" lvl="0" indent="0" algn="ctr" defTabSz="914400" rtl="0" eaLnBrk="0" fontAlgn="base" latinLnBrk="0" hangingPunct="0">
                 <a:lnSpc>
                   <a:spcPct val="100000"/>
                 </a:lnSpc>
@@ -3580,7 +3589,7 @@
                 <a:tabLst/>
               </a:pPr>
               <a:r>
-                <a:rPr kumimoji="0" lang="en-US" altLang="en-US" b="0" i="0" u="none" strike="noStrike" cap="none" normalizeH="0" baseline="0">
+                <a:rPr kumimoji="0" lang="en-US" altLang="en-US" b="1" i="0" u="none" strike="noStrike" cap="none" normalizeH="0" baseline="0" dirty="0">
                   <a:ln>
                     <a:noFill/>
                   </a:ln>
@@ -3593,7 +3602,7 @@
                 </a:rPr>
                 <a:t>Security Domain C</a:t>
               </a:r>
-              <a:endParaRPr kumimoji="0" lang="en-US" altLang="en-US" sz="2800" b="0" i="0" u="none" strike="noStrike" cap="none" normalizeH="0" baseline="0">
+              <a:endParaRPr kumimoji="0" lang="en-US" altLang="en-US" sz="2800" b="1" i="0" u="none" strike="noStrike" cap="none" normalizeH="0" baseline="0" dirty="0">
                 <a:ln>
                   <a:noFill/>
                 </a:ln>
@@ -3622,14 +3631,14 @@
           </p:nvSpPr>
           <p:spPr bwMode="auto">
             <a:xfrm>
-              <a:off x="781049" y="2514600"/>
-              <a:ext cx="1070693" cy="495300"/>
+              <a:off x="410638" y="2547946"/>
+              <a:ext cx="1756957" cy="359061"/>
             </a:xfrm>
             <a:prstGeom prst="ellipse">
               <a:avLst/>
             </a:prstGeom>
             <a:solidFill>
-              <a:srgbClr val="FFFFFF"/>
+              <a:srgbClr val="F20000"/>
             </a:solidFill>
             <a:ln w="9525">
               <a:solidFill>
@@ -3648,7 +3657,7 @@
             </a:bodyPr>
             <a:lstStyle/>
             <a:p>
-              <a:pPr marL="0" marR="0" lvl="0" indent="0" algn="l" defTabSz="914400" rtl="0" eaLnBrk="0" fontAlgn="base" latinLnBrk="0" hangingPunct="0">
+              <a:pPr marL="0" marR="0" lvl="0" indent="0" algn="ctr" defTabSz="914400" rtl="0" eaLnBrk="0" fontAlgn="base" latinLnBrk="0" hangingPunct="0">
                 <a:lnSpc>
                   <a:spcPct val="100000"/>
                 </a:lnSpc>
@@ -3665,7 +3674,7 @@
                 <a:tabLst/>
               </a:pPr>
               <a:r>
-                <a:rPr kumimoji="0" lang="en-US" altLang="en-US" b="0" i="0" u="none" strike="noStrike" cap="none" normalizeH="0" baseline="0">
+                <a:rPr kumimoji="0" lang="en-US" altLang="en-US" b="0" i="0" u="none" strike="noStrike" cap="none" normalizeH="0" baseline="0" dirty="0">
                   <a:ln>
                     <a:noFill/>
                   </a:ln>
@@ -3676,9 +3685,9 @@
                   <a:latin typeface="Arial" panose="020B0604020202020204" pitchFamily="34" charset="0"/>
                   <a:ea typeface="Times New Roman" panose="02020603050405020304" pitchFamily="18" charset="0"/>
                 </a:rPr>
-                <a:t>Source</a:t>
+                <a:t>Document Source</a:t>
               </a:r>
-              <a:endParaRPr kumimoji="0" lang="en-US" altLang="en-US" sz="2800" b="0" i="0" u="none" strike="noStrike" cap="none" normalizeH="0" baseline="0">
+              <a:endParaRPr kumimoji="0" lang="en-US" altLang="en-US" sz="2800" b="0" i="0" u="none" strike="noStrike" cap="none" normalizeH="0" baseline="0" dirty="0">
                 <a:ln>
                   <a:noFill/>
                 </a:ln>
@@ -3707,14 +3716,14 @@
           </p:nvSpPr>
           <p:spPr bwMode="auto">
             <a:xfrm>
-              <a:off x="4219575" y="2533650"/>
-              <a:ext cx="1394131" cy="361950"/>
+              <a:off x="4275347" y="2786824"/>
+              <a:ext cx="2053769" cy="361950"/>
             </a:xfrm>
             <a:prstGeom prst="ellipse">
               <a:avLst/>
             </a:prstGeom>
             <a:solidFill>
-              <a:srgbClr val="FFFFFF"/>
+              <a:srgbClr val="F20000"/>
             </a:solidFill>
             <a:ln w="9525">
               <a:solidFill>
@@ -3733,206 +3742,7 @@
             </a:bodyPr>
             <a:lstStyle/>
             <a:p>
-              <a:pPr marL="0" marR="0" lvl="0" indent="0" algn="l" defTabSz="914400" rtl="0" eaLnBrk="0" fontAlgn="base" latinLnBrk="0" hangingPunct="0">
-                <a:lnSpc>
-                  <a:spcPct val="100000"/>
-                </a:lnSpc>
-                <a:spcBef>
-                  <a:spcPct val="0"/>
-                </a:spcBef>
-                <a:spcAft>
-                  <a:spcPct val="0"/>
-                </a:spcAft>
-                <a:buClrTx/>
-                <a:buSzTx/>
-                <a:buFontTx/>
-                <a:buNone/>
-                <a:tabLst/>
-              </a:pPr>
-              <a:r>
-                <a:rPr kumimoji="0" lang="en-US" altLang="en-US" b="0" i="0" u="none" strike="noStrike" cap="none" normalizeH="0" baseline="0">
-                  <a:ln>
-                    <a:noFill/>
-                  </a:ln>
-                  <a:solidFill>
-                    <a:schemeClr val="tx1"/>
-                  </a:solidFill>
-                  <a:effectLst/>
-                  <a:latin typeface="Arial" panose="020B0604020202020204" pitchFamily="34" charset="0"/>
-                  <a:ea typeface="Times New Roman" panose="02020603050405020304" pitchFamily="18" charset="0"/>
-                </a:rPr>
-                <a:t>Comsumer</a:t>
-              </a:r>
-              <a:endParaRPr kumimoji="0" lang="en-US" altLang="en-US" sz="2800" b="0" i="0" u="none" strike="noStrike" cap="none" normalizeH="0" baseline="0">
-                <a:ln>
-                  <a:noFill/>
-                </a:ln>
-                <a:solidFill>
-                  <a:schemeClr val="tx1"/>
-                </a:solidFill>
-                <a:effectLst/>
-                <a:latin typeface="Arial" panose="020B0604020202020204" pitchFamily="34" charset="0"/>
-              </a:endParaRPr>
-            </a:p>
-          </p:txBody>
-        </p:sp>
-        <p:sp>
-          <p:nvSpPr>
-            <p:cNvPr id="9" name="Line 8">
-              <a:extLst>
-                <a:ext uri="{FF2B5EF4-FFF2-40B4-BE49-F238E27FC236}">
-                  <a16:creationId xmlns:a16="http://schemas.microsoft.com/office/drawing/2014/main" id="{4C61ABF5-6F66-C54C-9035-7A00806A0B43}"/>
-                </a:ext>
-              </a:extLst>
-            </p:cNvPr>
-            <p:cNvSpPr>
-              <a:spLocks noChangeShapeType="1"/>
-            </p:cNvSpPr>
-            <p:nvPr/>
-          </p:nvSpPr>
-          <p:spPr bwMode="auto">
-            <a:xfrm flipV="1">
-              <a:off x="1638300" y="1447799"/>
-              <a:ext cx="1126458" cy="1190625"/>
-            </a:xfrm>
-            <a:prstGeom prst="line">
-              <a:avLst/>
-            </a:prstGeom>
-            <a:noFill/>
-            <a:ln w="9525">
-              <a:solidFill>
-                <a:srgbClr val="000000"/>
-              </a:solidFill>
-              <a:round/>
-              <a:headEnd/>
-              <a:tailEnd type="triangle" w="med" len="med"/>
-            </a:ln>
-            <a:extLst>
-              <a:ext uri="{909E8E84-426E-40DD-AFC4-6F175D3DCCD1}">
-                <a14:hiddenFill xmlns:a14="http://schemas.microsoft.com/office/drawing/2010/main">
-                  <a:noFill/>
-                </a14:hiddenFill>
-              </a:ext>
-            </a:extLst>
-          </p:spPr>
-          <p:txBody>
-            <a:bodyPr vert="horz" wrap="square" lIns="91440" tIns="45720" rIns="91440" bIns="45720" numCol="1" anchor="t" anchorCtr="0" compatLnSpc="1">
-              <a:prstTxWarp prst="textNoShape">
-                <a:avLst/>
-              </a:prstTxWarp>
-            </a:bodyPr>
-            <a:lstStyle/>
-            <a:p>
-              <a:endParaRPr lang="en-US" sz="2800"/>
-            </a:p>
-          </p:txBody>
-        </p:sp>
-        <p:sp>
-          <p:nvSpPr>
-            <p:cNvPr id="10" name="Line 7">
-              <a:extLst>
-                <a:ext uri="{FF2B5EF4-FFF2-40B4-BE49-F238E27FC236}">
-                  <a16:creationId xmlns:a16="http://schemas.microsoft.com/office/drawing/2014/main" id="{C891AEEE-491A-3443-B2D6-92B4FF5A045A}"/>
-                </a:ext>
-              </a:extLst>
-            </p:cNvPr>
-            <p:cNvSpPr>
-              <a:spLocks noChangeShapeType="1"/>
-            </p:cNvSpPr>
-            <p:nvPr/>
-          </p:nvSpPr>
-          <p:spPr bwMode="auto">
-            <a:xfrm>
-              <a:off x="3286125" y="1476375"/>
-              <a:ext cx="1171070" cy="1123950"/>
-            </a:xfrm>
-            <a:prstGeom prst="line">
-              <a:avLst/>
-            </a:prstGeom>
-            <a:noFill/>
-            <a:ln w="9525">
-              <a:solidFill>
-                <a:srgbClr val="000000"/>
-              </a:solidFill>
-              <a:round/>
-              <a:headEnd type="triangle" w="med" len="med"/>
-              <a:tailEnd/>
-            </a:ln>
-            <a:extLst>
-              <a:ext uri="{909E8E84-426E-40DD-AFC4-6F175D3DCCD1}">
-                <a14:hiddenFill xmlns:a14="http://schemas.microsoft.com/office/drawing/2010/main">
-                  <a:noFill/>
-                </a14:hiddenFill>
-              </a:ext>
-            </a:extLst>
-          </p:spPr>
-          <p:txBody>
-            <a:bodyPr vert="horz" wrap="square" lIns="91440" tIns="45720" rIns="91440" bIns="45720" numCol="1" anchor="t" anchorCtr="0" compatLnSpc="1">
-              <a:prstTxWarp prst="textNoShape">
-                <a:avLst/>
-              </a:prstTxWarp>
-            </a:bodyPr>
-            <a:lstStyle/>
-            <a:p>
-              <a:endParaRPr lang="en-US" sz="2800"/>
-            </a:p>
-          </p:txBody>
-        </p:sp>
-        <p:sp>
-          <p:nvSpPr>
-            <p:cNvPr id="11" name="Text Box 6">
-              <a:extLst>
-                <a:ext uri="{FF2B5EF4-FFF2-40B4-BE49-F238E27FC236}">
-                  <a16:creationId xmlns:a16="http://schemas.microsoft.com/office/drawing/2014/main" id="{315BA740-40B9-E441-BB74-7FC9782B2A97}"/>
-                </a:ext>
-              </a:extLst>
-            </p:cNvPr>
-            <p:cNvSpPr txBox="1">
-              <a:spLocks noChangeArrowheads="1"/>
-            </p:cNvSpPr>
-            <p:nvPr/>
-          </p:nvSpPr>
-          <p:spPr bwMode="auto">
-            <a:xfrm>
-              <a:off x="3038474" y="2000250"/>
-              <a:ext cx="1583733" cy="914400"/>
-            </a:xfrm>
-            <a:prstGeom prst="rect">
-              <a:avLst/>
-            </a:prstGeom>
-            <a:noFill/>
-            <a:ln>
-              <a:noFill/>
-            </a:ln>
-            <a:extLst>
-              <a:ext uri="{909E8E84-426E-40DD-AFC4-6F175D3DCCD1}">
-                <a14:hiddenFill xmlns:a14="http://schemas.microsoft.com/office/drawing/2010/main">
-                  <a:solidFill>
-                    <a:srgbClr val="FFFFFF"/>
-                  </a:solidFill>
-                </a14:hiddenFill>
-              </a:ext>
-              <a:ext uri="{91240B29-F687-4F45-9708-019B960494DF}">
-                <a14:hiddenLine xmlns:a14="http://schemas.microsoft.com/office/drawing/2010/main" w="9525">
-                  <a:solidFill>
-                    <a:srgbClr val="000000"/>
-                  </a:solidFill>
-                  <a:miter lim="800000"/>
-                  <a:headEnd/>
-                  <a:tailEnd/>
-                </a14:hiddenLine>
-              </a:ext>
-            </a:extLst>
-          </p:spPr>
-          <p:txBody>
-            <a:bodyPr vert="horz" wrap="square" lIns="91440" tIns="45720" rIns="91440" bIns="45720" numCol="1" anchor="t" anchorCtr="0" compatLnSpc="1">
-              <a:prstTxWarp prst="textNoShape">
-                <a:avLst/>
-              </a:prstTxWarp>
-            </a:bodyPr>
-            <a:lstStyle/>
-            <a:p>
-              <a:pPr marL="0" marR="0" lvl="0" indent="0" algn="l" defTabSz="914400" rtl="0" eaLnBrk="0" fontAlgn="base" latinLnBrk="0" hangingPunct="0">
+              <a:pPr marL="0" marR="0" lvl="0" indent="0" algn="ctr" defTabSz="914400" rtl="0" eaLnBrk="0" fontAlgn="base" latinLnBrk="0" hangingPunct="0">
                 <a:lnSpc>
                   <a:spcPct val="100000"/>
                 </a:lnSpc>
@@ -3960,9 +3770,9 @@
                   <a:latin typeface="Arial" panose="020B0604020202020204" pitchFamily="34" charset="0"/>
                   <a:ea typeface="Times New Roman" panose="02020603050405020304" pitchFamily="18" charset="0"/>
                 </a:rPr>
-                <a:t>Encrypted,</a:t>
+                <a:t>Document Consumer</a:t>
               </a:r>
-              <a:endParaRPr kumimoji="0" lang="en-US" altLang="en-US" sz="1200" b="0" i="0" u="none" strike="noStrike" cap="none" normalizeH="0" baseline="0" dirty="0">
+              <a:endParaRPr kumimoji="0" lang="en-US" altLang="en-US" sz="2800" b="0" i="0" u="none" strike="noStrike" cap="none" normalizeH="0" baseline="0" dirty="0">
                 <a:ln>
                   <a:noFill/>
                 </a:ln>
@@ -3973,6 +3783,61 @@
                 <a:latin typeface="Arial" panose="020B0604020202020204" pitchFamily="34" charset="0"/>
               </a:endParaRPr>
             </a:p>
+          </p:txBody>
+        </p:sp>
+        <p:sp>
+          <p:nvSpPr>
+            <p:cNvPr id="11" name="Text Box 6">
+              <a:extLst>
+                <a:ext uri="{FF2B5EF4-FFF2-40B4-BE49-F238E27FC236}">
+                  <a16:creationId xmlns:a16="http://schemas.microsoft.com/office/drawing/2014/main" id="{315BA740-40B9-E441-BB74-7FC9782B2A97}"/>
+                </a:ext>
+              </a:extLst>
+            </p:cNvPr>
+            <p:cNvSpPr txBox="1">
+              <a:spLocks noChangeArrowheads="1"/>
+            </p:cNvSpPr>
+            <p:nvPr/>
+          </p:nvSpPr>
+          <p:spPr bwMode="auto">
+            <a:xfrm>
+              <a:off x="3001786" y="1974861"/>
+              <a:ext cx="1355198" cy="619126"/>
+            </a:xfrm>
+            <a:prstGeom prst="rect">
+              <a:avLst/>
+            </a:prstGeom>
+            <a:noFill/>
+            <a:ln>
+              <a:noFill/>
+            </a:ln>
+            <a:extLst>
+              <a:ext uri="{909E8E84-426E-40DD-AFC4-6F175D3DCCD1}">
+                <a14:hiddenFill xmlns:a14="http://schemas.microsoft.com/office/drawing/2010/main">
+                  <a:solidFill>
+                    <a:srgbClr val="FFFFFF"/>
+                  </a:solidFill>
+                </a14:hiddenFill>
+              </a:ext>
+              <a:ext uri="{91240B29-F687-4F45-9708-019B960494DF}">
+                <a14:hiddenLine xmlns:a14="http://schemas.microsoft.com/office/drawing/2010/main" w="9525">
+                  <a:solidFill>
+                    <a:srgbClr val="000000"/>
+                  </a:solidFill>
+                  <a:miter lim="800000"/>
+                  <a:headEnd/>
+                  <a:tailEnd/>
+                </a14:hiddenLine>
+              </a:ext>
+            </a:extLst>
+          </p:spPr>
+          <p:txBody>
+            <a:bodyPr vert="horz" wrap="square" lIns="91440" tIns="45720" rIns="91440" bIns="45720" numCol="1" anchor="t" anchorCtr="0" compatLnSpc="1">
+              <a:prstTxWarp prst="textNoShape">
+                <a:avLst/>
+              </a:prstTxWarp>
+            </a:bodyPr>
+            <a:lstStyle/>
             <a:p>
               <a:pPr marL="0" marR="0" lvl="0" indent="0" algn="l" defTabSz="914400" rtl="0" eaLnBrk="0" fontAlgn="base" latinLnBrk="0" hangingPunct="0">
                 <a:lnSpc>
@@ -3991,7 +3856,7 @@
                 <a:tabLst/>
               </a:pPr>
               <a:r>
-                <a:rPr kumimoji="0" lang="en-US" altLang="en-US" b="0" i="0" u="none" strike="noStrike" cap="none" normalizeH="0" baseline="0">
+                <a:rPr kumimoji="0" lang="en-US" altLang="en-US" sz="1600" b="0" i="0" u="none" strike="noStrike" cap="none" normalizeH="0" baseline="0" dirty="0">
                   <a:ln>
                     <a:noFill/>
                   </a:ln>
@@ -4002,9 +3867,9 @@
                   <a:latin typeface="Arial" panose="020B0604020202020204" pitchFamily="34" charset="0"/>
                   <a:ea typeface="Times New Roman" panose="02020603050405020304" pitchFamily="18" charset="0"/>
                 </a:rPr>
-                <a:t>TLS, Authenticated if Online</a:t>
+                <a:t>Encrypted, TLS, Authenticated if Online</a:t>
               </a:r>
-              <a:endParaRPr kumimoji="0" lang="en-US" altLang="en-US" sz="2800" b="0" i="0" u="none" strike="noStrike" cap="none" normalizeH="0" baseline="0">
+              <a:endParaRPr kumimoji="0" lang="en-US" altLang="en-US" sz="1600" b="0" i="0" u="none" strike="noStrike" cap="none" normalizeH="0" baseline="0" dirty="0">
                 <a:ln>
                   <a:noFill/>
                 </a:ln>
@@ -4033,8 +3898,8 @@
           </p:nvSpPr>
           <p:spPr bwMode="auto">
             <a:xfrm>
-              <a:off x="1066799" y="1428750"/>
-              <a:ext cx="1583733" cy="914400"/>
+              <a:off x="904813" y="1617585"/>
+              <a:ext cx="1355141" cy="543492"/>
             </a:xfrm>
             <a:prstGeom prst="rect">
               <a:avLst/>
@@ -4088,7 +3953,7 @@
                 <a:tabLst/>
               </a:pPr>
               <a:r>
-                <a:rPr kumimoji="0" lang="en-US" altLang="en-US" b="0" i="0" u="none" strike="noStrike" cap="none" normalizeH="0" baseline="0">
+                <a:rPr kumimoji="0" lang="en-US" altLang="en-US" sz="1600" b="0" i="0" u="none" strike="noStrike" cap="none" normalizeH="0" baseline="0" dirty="0">
                   <a:ln>
                     <a:noFill/>
                   </a:ln>
@@ -4099,38 +3964,10 @@
                   <a:latin typeface="Arial" panose="020B0604020202020204" pitchFamily="34" charset="0"/>
                   <a:ea typeface="Times New Roman" panose="02020603050405020304" pitchFamily="18" charset="0"/>
                 </a:rPr>
-                <a:t>Encrypted,</a:t>
+                <a:t>Encrypted, </a:t>
               </a:r>
-              <a:endParaRPr kumimoji="0" lang="en-US" altLang="en-US" sz="1200" b="0" i="0" u="none" strike="noStrike" cap="none" normalizeH="0" baseline="0">
-                <a:ln>
-                  <a:noFill/>
-                </a:ln>
-                <a:solidFill>
-                  <a:schemeClr val="tx1"/>
-                </a:solidFill>
-                <a:effectLst/>
-                <a:latin typeface="Arial" panose="020B0604020202020204" pitchFamily="34" charset="0"/>
-              </a:endParaRPr>
-            </a:p>
-            <a:p>
-              <a:pPr marL="0" marR="0" lvl="0" indent="0" algn="l" defTabSz="914400" rtl="0" eaLnBrk="0" fontAlgn="base" latinLnBrk="0" hangingPunct="0">
-                <a:lnSpc>
-                  <a:spcPct val="100000"/>
-                </a:lnSpc>
-                <a:spcBef>
-                  <a:spcPct val="0"/>
-                </a:spcBef>
-                <a:spcAft>
-                  <a:spcPct val="0"/>
-                </a:spcAft>
-                <a:buClrTx/>
-                <a:buSzTx/>
-                <a:buFontTx/>
-                <a:buNone/>
-                <a:tabLst/>
-              </a:pPr>
               <a:r>
-                <a:rPr kumimoji="0" lang="en-US" altLang="en-US" b="0" i="0" u="none" strike="noStrike" cap="none" normalizeH="0" baseline="0">
+                <a:rPr kumimoji="0" lang="en-US" altLang="en-US" sz="1600" b="0" i="0" u="none" strike="noStrike" cap="none" normalizeH="0" baseline="0" dirty="0" err="1">
                   <a:ln>
                     <a:noFill/>
                   </a:ln>
@@ -4141,9 +3978,23 @@
                   <a:latin typeface="Arial" panose="020B0604020202020204" pitchFamily="34" charset="0"/>
                   <a:ea typeface="Times New Roman" panose="02020603050405020304" pitchFamily="18" charset="0"/>
                 </a:rPr>
-                <a:t>S/MIME, Signed if Offline</a:t>
+                <a:t>SMIME</a:t>
               </a:r>
-              <a:endParaRPr kumimoji="0" lang="en-US" altLang="en-US" sz="2800" b="0" i="0" u="none" strike="noStrike" cap="none" normalizeH="0" baseline="0">
+              <a:r>
+                <a:rPr kumimoji="0" lang="en-US" altLang="en-US" sz="1600" b="0" i="0" u="none" strike="noStrike" cap="none" normalizeH="0" baseline="0" dirty="0">
+                  <a:ln>
+                    <a:noFill/>
+                  </a:ln>
+                  <a:solidFill>
+                    <a:schemeClr val="tx1"/>
+                  </a:solidFill>
+                  <a:effectLst/>
+                  <a:latin typeface="Arial" panose="020B0604020202020204" pitchFamily="34" charset="0"/>
+                  <a:ea typeface="Times New Roman" panose="02020603050405020304" pitchFamily="18" charset="0"/>
+                </a:rPr>
+                <a:t>, Signed if Offline</a:t>
+              </a:r>
+              <a:endParaRPr kumimoji="0" lang="en-US" altLang="en-US" sz="1600" b="0" i="0" u="none" strike="noStrike" cap="none" normalizeH="0" baseline="0" dirty="0">
                 <a:ln>
                   <a:noFill/>
                 </a:ln>
@@ -4172,14 +4023,14 @@
           </p:nvSpPr>
           <p:spPr bwMode="auto">
             <a:xfrm>
-              <a:off x="2809875" y="838200"/>
-              <a:ext cx="1416437" cy="400050"/>
+              <a:off x="2052198" y="878586"/>
+              <a:ext cx="2078829" cy="400050"/>
             </a:xfrm>
             <a:prstGeom prst="ellipse">
               <a:avLst/>
             </a:prstGeom>
             <a:solidFill>
-              <a:srgbClr val="FFFFFF"/>
+              <a:srgbClr val="F20000"/>
             </a:solidFill>
             <a:ln w="9525">
               <a:solidFill>
@@ -4198,7 +4049,7 @@
             </a:bodyPr>
             <a:lstStyle/>
             <a:p>
-              <a:pPr marL="0" marR="0" lvl="0" indent="0" algn="l" defTabSz="914400" rtl="0" eaLnBrk="0" fontAlgn="base" latinLnBrk="0" hangingPunct="0">
+              <a:pPr marL="0" marR="0" lvl="0" indent="0" algn="ctr" defTabSz="914400" rtl="0" eaLnBrk="0" fontAlgn="base" latinLnBrk="0" hangingPunct="0">
                 <a:lnSpc>
                   <a:spcPct val="100000"/>
                 </a:lnSpc>
@@ -4215,7 +4066,7 @@
                 <a:tabLst/>
               </a:pPr>
               <a:r>
-                <a:rPr kumimoji="0" lang="en-US" altLang="en-US" b="0" i="0" u="none" strike="noStrike" cap="none" normalizeH="0" baseline="0">
+                <a:rPr kumimoji="0" lang="en-US" altLang="en-US" b="0" i="0" u="none" strike="noStrike" cap="none" normalizeH="0" baseline="0" dirty="0">
                   <a:ln>
                     <a:noFill/>
                   </a:ln>
@@ -4226,9 +4077,9 @@
                   <a:latin typeface="Arial" panose="020B0604020202020204" pitchFamily="34" charset="0"/>
                   <a:ea typeface="Times New Roman" panose="02020603050405020304" pitchFamily="18" charset="0"/>
                 </a:rPr>
-                <a:t>Repositoryy</a:t>
+                <a:t>Document Repository</a:t>
               </a:r>
-              <a:endParaRPr kumimoji="0" lang="en-US" altLang="en-US" sz="2800" b="0" i="0" u="none" strike="noStrike" cap="none" normalizeH="0" baseline="0">
+              <a:endParaRPr kumimoji="0" lang="en-US" altLang="en-US" sz="2800" b="0" i="0" u="none" strike="noStrike" cap="none" normalizeH="0" baseline="0" dirty="0">
                 <a:ln>
                   <a:noFill/>
                 </a:ln>
@@ -4257,14 +4108,14 @@
           </p:nvSpPr>
           <p:spPr bwMode="auto">
             <a:xfrm>
-              <a:off x="2466975" y="1095375"/>
-              <a:ext cx="1260294" cy="400050"/>
+              <a:off x="2074795" y="1225405"/>
+              <a:ext cx="1962361" cy="400050"/>
             </a:xfrm>
             <a:prstGeom prst="ellipse">
               <a:avLst/>
             </a:prstGeom>
             <a:solidFill>
-              <a:srgbClr val="FFFFFF"/>
+              <a:srgbClr val="F20000"/>
             </a:solidFill>
             <a:ln w="9525">
               <a:solidFill>
@@ -4283,7 +4134,7 @@
             </a:bodyPr>
             <a:lstStyle/>
             <a:p>
-              <a:pPr marL="0" marR="0" lvl="0" indent="0" algn="l" defTabSz="914400" rtl="0" eaLnBrk="0" fontAlgn="base" latinLnBrk="0" hangingPunct="0">
+              <a:pPr marL="0" marR="0" lvl="0" indent="0" algn="ctr" defTabSz="914400" rtl="0" eaLnBrk="0" fontAlgn="base" latinLnBrk="0" hangingPunct="0">
                 <a:lnSpc>
                   <a:spcPct val="100000"/>
                 </a:lnSpc>
@@ -4300,7 +4151,7 @@
                 <a:tabLst/>
               </a:pPr>
               <a:r>
-                <a:rPr kumimoji="0" lang="en-US" altLang="en-US" b="0" i="0" u="none" strike="noStrike" cap="none" normalizeH="0" baseline="0">
+                <a:rPr kumimoji="0" lang="en-US" altLang="en-US" b="0" i="0" u="none" strike="noStrike" cap="none" normalizeH="0" baseline="0" dirty="0">
                   <a:ln>
                     <a:noFill/>
                   </a:ln>
@@ -4311,9 +4162,9 @@
                   <a:latin typeface="Arial" panose="020B0604020202020204" pitchFamily="34" charset="0"/>
                   <a:ea typeface="Times New Roman" panose="02020603050405020304" pitchFamily="18" charset="0"/>
                 </a:rPr>
-                <a:t>Registry</a:t>
+                <a:t>Document Registry</a:t>
               </a:r>
-              <a:endParaRPr kumimoji="0" lang="en-US" altLang="en-US" sz="2800" b="0" i="0" u="none" strike="noStrike" cap="none" normalizeH="0" baseline="0">
+              <a:endParaRPr kumimoji="0" lang="en-US" altLang="en-US" sz="2800" b="0" i="0" u="none" strike="noStrike" cap="none" normalizeH="0" baseline="0" dirty="0">
                 <a:ln>
                   <a:noFill/>
                 </a:ln>
@@ -4342,7 +4193,7 @@
           </p:nvSpPr>
           <p:spPr bwMode="auto">
             <a:xfrm>
-              <a:off x="285750" y="3781425"/>
+              <a:off x="295241" y="3660211"/>
               <a:ext cx="6067258" cy="276225"/>
             </a:xfrm>
             <a:prstGeom prst="rect">
@@ -4379,35 +4230,6 @@
               </a:prstTxWarp>
             </a:bodyPr>
             <a:lstStyle/>
-            <a:p>
-              <a:pPr marL="0" marR="0" lvl="0" indent="0" algn="l" defTabSz="914400" rtl="0" eaLnBrk="0" fontAlgn="base" latinLnBrk="0" hangingPunct="0">
-                <a:lnSpc>
-                  <a:spcPct val="100000"/>
-                </a:lnSpc>
-                <a:spcBef>
-                  <a:spcPct val="0"/>
-                </a:spcBef>
-                <a:spcAft>
-                  <a:spcPct val="0"/>
-                </a:spcAft>
-                <a:buClrTx/>
-                <a:buSzTx/>
-                <a:buFontTx/>
-                <a:buNone/>
-                <a:tabLst/>
-              </a:pPr>
-              <a:endParaRPr kumimoji="0" lang="en-US" altLang="en-US" b="0" i="0" u="none" strike="noStrike" cap="none" normalizeH="0" baseline="0">
-                <a:ln>
-                  <a:noFill/>
-                </a:ln>
-                <a:solidFill>
-                  <a:schemeClr val="tx1"/>
-                </a:solidFill>
-                <a:effectLst/>
-                <a:latin typeface="Arial" panose="020B0604020202020204" pitchFamily="34" charset="0"/>
-                <a:ea typeface="Times New Roman" panose="02020603050405020304" pitchFamily="18" charset="0"/>
-              </a:endParaRPr>
-            </a:p>
             <a:p>
               <a:pPr marL="0" marR="0" lvl="0" indent="0" algn="ctr" defTabSz="914400" rtl="0" eaLnBrk="0" fontAlgn="base" latinLnBrk="0" hangingPunct="0">
                 <a:lnSpc>
@@ -4426,7 +4248,7 @@
                 <a:tabLst/>
               </a:pPr>
               <a:r>
-                <a:rPr kumimoji="0" lang="en-US" altLang="en-US" b="0" i="0" u="none" strike="noStrike" cap="none" normalizeH="0" baseline="0">
+                <a:rPr kumimoji="0" lang="en-US" altLang="en-US" b="0" i="0" u="none" strike="noStrike" cap="none" normalizeH="0" baseline="0" dirty="0">
                   <a:ln>
                     <a:noFill/>
                   </a:ln>
@@ -4437,9 +4259,9 @@
                   <a:latin typeface="Arial" panose="020B0604020202020204" pitchFamily="34" charset="0"/>
                   <a:ea typeface="Times New Roman" panose="02020603050405020304" pitchFamily="18" charset="0"/>
                 </a:rPr>
-                <a:t>All Actors are part of the same Clinical Affinity Domain</a:t>
+                <a:t>All Actors Are Part of the Same Clinical Affinity Domain</a:t>
               </a:r>
-              <a:endParaRPr kumimoji="0" lang="en-US" altLang="en-US" sz="2800" b="0" i="0" u="none" strike="noStrike" cap="none" normalizeH="0" baseline="0">
+              <a:endParaRPr kumimoji="0" lang="en-US" altLang="en-US" sz="2800" b="0" i="0" u="none" strike="noStrike" cap="none" normalizeH="0" baseline="0" dirty="0">
                 <a:ln>
                   <a:noFill/>
                 </a:ln>
@@ -4468,14 +4290,14 @@
           </p:nvSpPr>
           <p:spPr bwMode="auto">
             <a:xfrm>
-              <a:off x="523875" y="2857500"/>
-              <a:ext cx="1416437" cy="400050"/>
+              <a:off x="197577" y="2844071"/>
+              <a:ext cx="2114338" cy="400050"/>
             </a:xfrm>
             <a:prstGeom prst="ellipse">
               <a:avLst/>
             </a:prstGeom>
             <a:solidFill>
-              <a:srgbClr val="FFFFFF"/>
+              <a:srgbClr val="F20000"/>
             </a:solidFill>
             <a:ln w="9525">
               <a:solidFill>
@@ -4494,7 +4316,7 @@
             </a:bodyPr>
             <a:lstStyle/>
             <a:p>
-              <a:pPr marL="0" marR="0" lvl="0" indent="0" algn="l" defTabSz="914400" rtl="0" eaLnBrk="0" fontAlgn="base" latinLnBrk="0" hangingPunct="0">
+              <a:pPr marL="0" marR="0" lvl="0" indent="0" algn="ctr" defTabSz="914400" rtl="0" eaLnBrk="0" fontAlgn="base" latinLnBrk="0" hangingPunct="0">
                 <a:lnSpc>
                   <a:spcPct val="100000"/>
                 </a:lnSpc>
@@ -4511,7 +4333,7 @@
                 <a:tabLst/>
               </a:pPr>
               <a:r>
-                <a:rPr kumimoji="0" lang="en-US" altLang="en-US" b="0" i="0" u="none" strike="noStrike" cap="none" normalizeH="0" baseline="0">
+                <a:rPr kumimoji="0" lang="en-US" altLang="en-US" b="0" i="0" u="none" strike="noStrike" cap="none" normalizeH="0" baseline="0" dirty="0">
                   <a:ln>
                     <a:noFill/>
                   </a:ln>
@@ -4522,7 +4344,7 @@
                   <a:latin typeface="Arial" panose="020B0604020202020204" pitchFamily="34" charset="0"/>
                   <a:ea typeface="Times New Roman" panose="02020603050405020304" pitchFamily="18" charset="0"/>
                 </a:rPr>
-                <a:t>Repository</a:t>
+                <a:t>Document Repository</a:t>
               </a:r>
               <a:endParaRPr kumimoji="0" lang="en-US" altLang="en-US" sz="2800" b="0" i="0" u="none" strike="noStrike" cap="none" normalizeH="0" baseline="0" dirty="0">
                 <a:ln>
@@ -4534,57 +4356,6 @@
                 <a:effectLst/>
                 <a:latin typeface="Arial" panose="020B0604020202020204" pitchFamily="34" charset="0"/>
               </a:endParaRPr>
-            </a:p>
-          </p:txBody>
-        </p:sp>
-        <p:sp>
-          <p:nvSpPr>
-            <p:cNvPr id="17" name="Line 1">
-              <a:extLst>
-                <a:ext uri="{FF2B5EF4-FFF2-40B4-BE49-F238E27FC236}">
-                  <a16:creationId xmlns:a16="http://schemas.microsoft.com/office/drawing/2014/main" id="{E09FBFAC-EF27-534D-9ABB-7B9F6554E05C}"/>
-                </a:ext>
-              </a:extLst>
-            </p:cNvPr>
-            <p:cNvSpPr>
-              <a:spLocks noChangeShapeType="1"/>
-            </p:cNvSpPr>
-            <p:nvPr/>
-          </p:nvSpPr>
-          <p:spPr bwMode="auto">
-            <a:xfrm flipH="1">
-              <a:off x="1733550" y="2714625"/>
-              <a:ext cx="2922098" cy="295275"/>
-            </a:xfrm>
-            <a:prstGeom prst="line">
-              <a:avLst/>
-            </a:prstGeom>
-            <a:noFill/>
-            <a:ln w="9525">
-              <a:solidFill>
-                <a:srgbClr val="000000"/>
-              </a:solidFill>
-              <a:round/>
-              <a:headEnd/>
-              <a:tailEnd type="triangle" w="med" len="med"/>
-            </a:ln>
-            <a:extLst>
-              <a:ext uri="{909E8E84-426E-40DD-AFC4-6F175D3DCCD1}">
-                <a14:hiddenFill xmlns:a14="http://schemas.microsoft.com/office/drawing/2010/main">
-                  <a:noFill/>
-                </a14:hiddenFill>
-              </a:ext>
-            </a:extLst>
-          </p:spPr>
-          <p:txBody>
-            <a:bodyPr vert="horz" wrap="square" lIns="91440" tIns="45720" rIns="91440" bIns="45720" numCol="1" anchor="t" anchorCtr="0" compatLnSpc="1">
-              <a:prstTxWarp prst="textNoShape">
-                <a:avLst/>
-              </a:prstTxWarp>
-            </a:bodyPr>
-            <a:lstStyle/>
-            <a:p>
-              <a:endParaRPr lang="en-US" sz="2800"/>
             </a:p>
           </p:txBody>
         </p:sp>
@@ -4658,10 +4429,147 @@
           </a:p>
         </p:txBody>
       </p:sp>
+      <p:cxnSp>
+        <p:nvCxnSpPr>
+          <p:cNvPr id="19" name="Straight Arrow Connector 18">
+            <a:extLst>
+              <a:ext uri="{FF2B5EF4-FFF2-40B4-BE49-F238E27FC236}">
+                <a16:creationId xmlns:a16="http://schemas.microsoft.com/office/drawing/2014/main" id="{5430470B-7F7F-5696-0B1E-48F269CB6BC6}"/>
+              </a:ext>
+            </a:extLst>
+          </p:cNvPr>
+          <p:cNvCxnSpPr>
+            <a:stCxn id="7" idx="7"/>
+            <a:endCxn id="14" idx="3"/>
+          </p:cNvCxnSpPr>
+          <p:nvPr/>
+        </p:nvCxnSpPr>
+        <p:spPr>
+          <a:xfrm flipV="1">
+            <a:off x="3776563" y="2375757"/>
+            <a:ext cx="738848" cy="1690082"/>
+          </a:xfrm>
+          <a:prstGeom prst="straightConnector1">
+            <a:avLst/>
+          </a:prstGeom>
+          <a:ln w="31750">
+            <a:solidFill>
+              <a:schemeClr val="tx1"/>
+            </a:solidFill>
+            <a:headEnd w="lg" len="lg"/>
+            <a:tailEnd type="triangle" w="lg" len="lg"/>
+          </a:ln>
+        </p:spPr>
+        <p:style>
+          <a:lnRef idx="1">
+            <a:schemeClr val="accent1"/>
+          </a:lnRef>
+          <a:fillRef idx="0">
+            <a:schemeClr val="accent1"/>
+          </a:fillRef>
+          <a:effectRef idx="0">
+            <a:schemeClr val="accent1"/>
+          </a:effectRef>
+          <a:fontRef idx="minor">
+            <a:schemeClr val="tx1"/>
+          </a:fontRef>
+        </p:style>
+      </p:cxnSp>
+      <p:cxnSp>
+        <p:nvCxnSpPr>
+          <p:cNvPr id="21" name="Straight Arrow Connector 20">
+            <a:extLst>
+              <a:ext uri="{FF2B5EF4-FFF2-40B4-BE49-F238E27FC236}">
+                <a16:creationId xmlns:a16="http://schemas.microsoft.com/office/drawing/2014/main" id="{4EA2F390-253F-A616-DE53-A02BD3E35E2B}"/>
+              </a:ext>
+            </a:extLst>
+          </p:cNvPr>
+          <p:cNvCxnSpPr>
+            <a:stCxn id="8" idx="1"/>
+            <a:endCxn id="14" idx="5"/>
+          </p:cNvCxnSpPr>
+          <p:nvPr/>
+        </p:nvCxnSpPr>
+        <p:spPr>
+          <a:xfrm flipH="1" flipV="1">
+            <a:off x="6784199" y="2375757"/>
+            <a:ext cx="1351104" cy="2081351"/>
+          </a:xfrm>
+          <a:prstGeom prst="straightConnector1">
+            <a:avLst/>
+          </a:prstGeom>
+          <a:ln w="31750">
+            <a:solidFill>
+              <a:schemeClr val="tx1"/>
+            </a:solidFill>
+            <a:tailEnd type="triangle" w="lg" len="lg"/>
+          </a:ln>
+        </p:spPr>
+        <p:style>
+          <a:lnRef idx="1">
+            <a:schemeClr val="accent1"/>
+          </a:lnRef>
+          <a:fillRef idx="0">
+            <a:schemeClr val="accent1"/>
+          </a:fillRef>
+          <a:effectRef idx="0">
+            <a:schemeClr val="accent1"/>
+          </a:effectRef>
+          <a:fontRef idx="minor">
+            <a:schemeClr val="tx1"/>
+          </a:fontRef>
+        </p:style>
+      </p:cxnSp>
+      <p:cxnSp>
+        <p:nvCxnSpPr>
+          <p:cNvPr id="23" name="Straight Arrow Connector 22">
+            <a:extLst>
+              <a:ext uri="{FF2B5EF4-FFF2-40B4-BE49-F238E27FC236}">
+                <a16:creationId xmlns:a16="http://schemas.microsoft.com/office/drawing/2014/main" id="{569776EB-32D2-FA86-A68A-3115BDE67453}"/>
+              </a:ext>
+            </a:extLst>
+          </p:cNvPr>
+          <p:cNvCxnSpPr>
+            <a:cxnSpLocks/>
+            <a:stCxn id="8" idx="2"/>
+            <a:endCxn id="16" idx="6"/>
+          </p:cNvCxnSpPr>
+          <p:nvPr/>
+        </p:nvCxnSpPr>
+        <p:spPr>
+          <a:xfrm flipH="1">
+            <a:off x="4433231" y="4666343"/>
+            <a:ext cx="3210303" cy="124749"/>
+          </a:xfrm>
+          <a:prstGeom prst="straightConnector1">
+            <a:avLst/>
+          </a:prstGeom>
+          <a:ln w="31750">
+            <a:solidFill>
+              <a:schemeClr val="tx1"/>
+            </a:solidFill>
+            <a:tailEnd type="triangle" w="lg" len="lg"/>
+          </a:ln>
+        </p:spPr>
+        <p:style>
+          <a:lnRef idx="1">
+            <a:schemeClr val="accent1"/>
+          </a:lnRef>
+          <a:fillRef idx="0">
+            <a:schemeClr val="accent1"/>
+          </a:fillRef>
+          <a:effectRef idx="0">
+            <a:schemeClr val="accent1"/>
+          </a:effectRef>
+          <a:fontRef idx="minor">
+            <a:schemeClr val="tx1"/>
+          </a:fontRef>
+        </p:style>
+      </p:cxnSp>
     </p:spTree>
     <p:extLst>
       <p:ext uri="{BB962C8B-B14F-4D97-AF65-F5344CB8AC3E}">
-        <p14:creationId xmlns:p14="http://schemas.microsoft.com/office/powerpoint/2010/main" val="1871421561"/>
+        <p14:creationId xmlns:p14="http://schemas.microsoft.com/office/powerpoint/2010/main" val="508858705"/>
       </p:ext>
     </p:extLst>
   </p:cSld>

</xml_diff>